<commit_message>
add colour average all model
</commit_message>
<xml_diff>
--- a/RSA/Auxiliary Scripts/Image_Based_Models.pptx
+++ b/RSA/Auxiliary Scripts/Image_Based_Models.pptx
@@ -13,6 +13,7 @@
     <p:sldId id="265" r:id="rId7"/>
     <p:sldId id="266" r:id="rId8"/>
     <p:sldId id="267" r:id="rId9"/>
+    <p:sldId id="268" r:id="rId10"/>
   </p:sldIdLst>
   <p:sldSz cx="12192000" cy="6858000"/>
   <p:notesSz cx="6858000" cy="9144000"/>
@@ -4568,7 +4569,6 @@
               <a:rPr lang="en-US" dirty="0" smtClean="0"/>
               <a:t>Find foreground pixels</a:t>
             </a:r>
-            <a:endParaRPr lang="en-US" dirty="0" smtClean="0"/>
           </a:p>
           <a:p>
             <a:pPr marL="342900" indent="-342900">
@@ -4593,17 +4593,8 @@
             </a:pPr>
             <a:r>
               <a:rPr lang="en-US" dirty="0" smtClean="0"/>
-              <a:t>Compute </a:t>
-            </a:r>
-            <a:r>
-              <a:rPr lang="en-US" dirty="0" smtClean="0"/>
-              <a:t>distance </a:t>
-            </a:r>
-            <a:r>
-              <a:rPr lang="en-US" dirty="0" smtClean="0"/>
-              <a:t>matrix (3-dimension point distances)</a:t>
-            </a:r>
-            <a:endParaRPr lang="en-US" dirty="0" smtClean="0"/>
+              <a:t>Compute distance matrix (3-dimension point distances)</a:t>
+            </a:r>
           </a:p>
           <a:p>
             <a:pPr marL="342900" indent="-342900">
@@ -4710,6 +4701,202 @@
     <p:extLst>
       <p:ext uri="{BB962C8B-B14F-4D97-AF65-F5344CB8AC3E}">
         <p14:creationId xmlns:p14="http://schemas.microsoft.com/office/powerpoint/2010/main" val="3609503012"/>
+      </p:ext>
+    </p:extLst>
+  </p:cSld>
+  <p:clrMapOvr>
+    <a:masterClrMapping/>
+  </p:clrMapOvr>
+</p:sld>
+</file>
+
+<file path=ppt/slides/slide9.xml><?xml version="1.0" encoding="utf-8"?>
+<p:sld xmlns:a="http://schemas.openxmlformats.org/drawingml/2006/main" xmlns:r="http://schemas.openxmlformats.org/officeDocument/2006/relationships" xmlns:p="http://schemas.openxmlformats.org/presentationml/2006/main">
+  <p:cSld>
+    <p:spTree>
+      <p:nvGrpSpPr>
+        <p:cNvPr id="1" name=""/>
+        <p:cNvGrpSpPr/>
+        <p:nvPr/>
+      </p:nvGrpSpPr>
+      <p:grpSpPr>
+        <a:xfrm>
+          <a:off x="0" y="0"/>
+          <a:ext cx="0" cy="0"/>
+          <a:chOff x="0" y="0"/>
+          <a:chExt cx="0" cy="0"/>
+        </a:xfrm>
+      </p:grpSpPr>
+      <p:sp>
+        <p:nvSpPr>
+          <p:cNvPr id="2" name="Title 1"/>
+          <p:cNvSpPr>
+            <a:spLocks noGrp="1"/>
+          </p:cNvSpPr>
+          <p:nvPr>
+            <p:ph type="title"/>
+          </p:nvPr>
+        </p:nvSpPr>
+        <p:spPr/>
+        <p:txBody>
+          <a:bodyPr/>
+          <a:lstStyle/>
+          <a:p>
+            <a:r>
+              <a:rPr lang="en-US" dirty="0" err="1" smtClean="0"/>
+              <a:t>Colour</a:t>
+            </a:r>
+            <a:r>
+              <a:rPr lang="en-US" dirty="0" smtClean="0"/>
+              <a:t> </a:t>
+            </a:r>
+            <a:r>
+              <a:rPr lang="en-US" dirty="0" smtClean="0"/>
+              <a:t>Average (All)</a:t>
+            </a:r>
+            <a:endParaRPr lang="en-US" dirty="0"/>
+          </a:p>
+        </p:txBody>
+      </p:sp>
+      <p:sp>
+        <p:nvSpPr>
+          <p:cNvPr id="5" name="TextBox 4"/>
+          <p:cNvSpPr txBox="1"/>
+          <p:nvPr/>
+        </p:nvSpPr>
+        <p:spPr>
+          <a:xfrm>
+            <a:off x="315080" y="5170431"/>
+            <a:ext cx="8259778" cy="646331"/>
+          </a:xfrm>
+          <a:prstGeom prst="rect">
+            <a:avLst/>
+          </a:prstGeom>
+          <a:noFill/>
+        </p:spPr>
+        <p:txBody>
+          <a:bodyPr wrap="square" rtlCol="0">
+            <a:spAutoFit/>
+          </a:bodyPr>
+          <a:lstStyle/>
+          <a:p>
+            <a:pPr marL="342900" indent="-342900">
+              <a:buAutoNum type="arabicPeriod"/>
+            </a:pPr>
+            <a:r>
+              <a:rPr lang="en-US" dirty="0"/>
+              <a:t>Same as </a:t>
+            </a:r>
+            <a:r>
+              <a:rPr lang="en-US" dirty="0" err="1"/>
+              <a:t>Colour</a:t>
+            </a:r>
+            <a:r>
+              <a:rPr lang="en-US" dirty="0"/>
+              <a:t> </a:t>
+            </a:r>
+            <a:r>
+              <a:rPr lang="en-US" dirty="0" smtClean="0"/>
+              <a:t>Average, but uses all pixels (not just foreground)</a:t>
+            </a:r>
+            <a:endParaRPr lang="en-US" dirty="0" smtClean="0"/>
+          </a:p>
+          <a:p>
+            <a:pPr marL="342900" indent="-342900">
+              <a:buAutoNum type="arabicPeriod"/>
+            </a:pPr>
+            <a:endParaRPr lang="en-US" dirty="0" smtClean="0"/>
+          </a:p>
+        </p:txBody>
+      </p:sp>
+      <p:pic>
+        <p:nvPicPr>
+          <p:cNvPr id="6" name="Picture 5"/>
+          <p:cNvPicPr>
+            <a:picLocks noChangeAspect="1"/>
+          </p:cNvPicPr>
+          <p:nvPr/>
+        </p:nvPicPr>
+        <p:blipFill>
+          <a:blip r:embed="rId2"/>
+          <a:stretch>
+            <a:fillRect/>
+          </a:stretch>
+        </p:blipFill>
+        <p:spPr>
+          <a:xfrm>
+            <a:off x="522261" y="1280811"/>
+            <a:ext cx="4544758" cy="3948880"/>
+          </a:xfrm>
+          <a:prstGeom prst="rect">
+            <a:avLst/>
+          </a:prstGeom>
+        </p:spPr>
+      </p:pic>
+      <p:pic>
+        <p:nvPicPr>
+          <p:cNvPr id="7" name="Picture 6"/>
+          <p:cNvPicPr>
+            <a:picLocks noChangeAspect="1"/>
+          </p:cNvPicPr>
+          <p:nvPr/>
+        </p:nvPicPr>
+        <p:blipFill>
+          <a:blip r:embed="rId3" cstate="print">
+            <a:extLst>
+              <a:ext uri="{28A0092B-C50C-407E-A947-70E740481C1C}">
+                <a14:useLocalDpi xmlns:a14="http://schemas.microsoft.com/office/drawing/2010/main" val="0"/>
+              </a:ext>
+            </a:extLst>
+          </a:blip>
+          <a:stretch>
+            <a:fillRect/>
+          </a:stretch>
+        </p:blipFill>
+        <p:spPr>
+          <a:xfrm>
+            <a:off x="8474591" y="3435942"/>
+            <a:ext cx="3205101" cy="2609486"/>
+          </a:xfrm>
+          <a:prstGeom prst="rect">
+            <a:avLst/>
+          </a:prstGeom>
+        </p:spPr>
+      </p:pic>
+      <p:pic>
+        <p:nvPicPr>
+          <p:cNvPr id="8" name="Picture 7"/>
+          <p:cNvPicPr>
+            <a:picLocks noChangeAspect="1"/>
+          </p:cNvPicPr>
+          <p:nvPr/>
+        </p:nvPicPr>
+        <p:blipFill>
+          <a:blip r:embed="rId4" cstate="print">
+            <a:extLst>
+              <a:ext uri="{28A0092B-C50C-407E-A947-70E740481C1C}">
+                <a14:useLocalDpi xmlns:a14="http://schemas.microsoft.com/office/drawing/2010/main" val="0"/>
+              </a:ext>
+            </a:extLst>
+          </a:blip>
+          <a:stretch>
+            <a:fillRect/>
+          </a:stretch>
+        </p:blipFill>
+        <p:spPr>
+          <a:xfrm>
+            <a:off x="8474593" y="554701"/>
+            <a:ext cx="3205099" cy="2609485"/>
+          </a:xfrm>
+          <a:prstGeom prst="rect">
+            <a:avLst/>
+          </a:prstGeom>
+        </p:spPr>
+      </p:pic>
+    </p:spTree>
+    <p:extLst>
+      <p:ext uri="{BB962C8B-B14F-4D97-AF65-F5344CB8AC3E}">
+        <p14:creationId xmlns:p14="http://schemas.microsoft.com/office/powerpoint/2010/main" val="1507937787"/>
       </p:ext>
     </p:extLst>
   </p:cSld>

</xml_diff>

<commit_message>
add colour profile model
</commit_message>
<xml_diff>
--- a/RSA/Auxiliary Scripts/Image_Based_Models.pptx
+++ b/RSA/Auxiliary Scripts/Image_Based_Models.pptx
@@ -14,6 +14,7 @@
     <p:sldId id="266" r:id="rId8"/>
     <p:sldId id="267" r:id="rId9"/>
     <p:sldId id="268" r:id="rId10"/>
+    <p:sldId id="269" r:id="rId11"/>
   </p:sldIdLst>
   <p:sldSz cx="12192000" cy="6858000"/>
   <p:notesSz cx="6858000" cy="9144000"/>
@@ -114,7 +115,7 @@
   </p:defaultTextStyle>
   <p:extLst>
     <p:ext uri="{EFAFB233-063F-42B5-8137-9DF3F51BA10A}">
-      <p15:sldGuideLst xmlns:p15="http://schemas.microsoft.com/office/powerpoint/2012/main"/>
+      <p15:sldGuideLst xmlns:p15="http://schemas.microsoft.com/office/powerpoint/2012/main" xmlns=""/>
     </p:ext>
   </p:extLst>
 </p:presentation>
@@ -3147,6 +3148,364 @@
 </p:sld>
 </file>
 
+<file path=ppt/slides/slide10.xml><?xml version="1.0" encoding="utf-8"?>
+<p:sld xmlns:a="http://schemas.openxmlformats.org/drawingml/2006/main" xmlns:r="http://schemas.openxmlformats.org/officeDocument/2006/relationships" xmlns:p="http://schemas.openxmlformats.org/presentationml/2006/main">
+  <p:cSld>
+    <p:spTree>
+      <p:nvGrpSpPr>
+        <p:cNvPr id="1" name=""/>
+        <p:cNvGrpSpPr/>
+        <p:nvPr/>
+      </p:nvGrpSpPr>
+      <p:grpSpPr>
+        <a:xfrm>
+          <a:off x="0" y="0"/>
+          <a:ext cx="0" cy="0"/>
+          <a:chOff x="0" y="0"/>
+          <a:chExt cx="0" cy="0"/>
+        </a:xfrm>
+      </p:grpSpPr>
+      <p:sp>
+        <p:nvSpPr>
+          <p:cNvPr id="2" name="Title 1"/>
+          <p:cNvSpPr>
+            <a:spLocks noGrp="1"/>
+          </p:cNvSpPr>
+          <p:nvPr>
+            <p:ph type="title"/>
+          </p:nvPr>
+        </p:nvSpPr>
+        <p:spPr/>
+        <p:txBody>
+          <a:bodyPr/>
+          <a:lstStyle/>
+          <a:p>
+            <a:r>
+              <a:rPr lang="en-US" dirty="0" err="1" smtClean="0"/>
+              <a:t>Colour</a:t>
+            </a:r>
+            <a:r>
+              <a:rPr lang="en-US" dirty="0" smtClean="0"/>
+              <a:t> Profile (foreground or all-pixels)</a:t>
+            </a:r>
+            <a:endParaRPr lang="en-US" dirty="0"/>
+          </a:p>
+        </p:txBody>
+      </p:sp>
+      <p:sp>
+        <p:nvSpPr>
+          <p:cNvPr id="5" name="TextBox 4"/>
+          <p:cNvSpPr txBox="1"/>
+          <p:nvPr/>
+        </p:nvSpPr>
+        <p:spPr>
+          <a:xfrm>
+            <a:off x="315080" y="5056131"/>
+            <a:ext cx="8259778" cy="1200329"/>
+          </a:xfrm>
+          <a:prstGeom prst="rect">
+            <a:avLst/>
+          </a:prstGeom>
+          <a:noFill/>
+        </p:spPr>
+        <p:txBody>
+          <a:bodyPr wrap="square" rtlCol="0">
+            <a:spAutoFit/>
+          </a:bodyPr>
+          <a:lstStyle/>
+          <a:p>
+            <a:pPr marL="342900" indent="-342900">
+              <a:buAutoNum type="arabicPeriod"/>
+            </a:pPr>
+            <a:r>
+              <a:rPr lang="en-US" dirty="0" smtClean="0"/>
+              <a:t>Reduce </a:t>
+            </a:r>
+            <a:r>
+              <a:rPr lang="en-US" dirty="0" err="1" smtClean="0"/>
+              <a:t>colour</a:t>
+            </a:r>
+            <a:r>
+              <a:rPr lang="en-US" dirty="0" smtClean="0"/>
+              <a:t> depth</a:t>
+            </a:r>
+            <a:r>
+              <a:rPr lang="en-US" dirty="0" smtClean="0"/>
+              <a:t> (default is 64 total </a:t>
+            </a:r>
+            <a:r>
+              <a:rPr lang="en-US" dirty="0" err="1" smtClean="0"/>
+              <a:t>colours</a:t>
+            </a:r>
+            <a:r>
+              <a:rPr lang="en-US" dirty="0" smtClean="0"/>
+              <a:t>, other options are 27 and 125)</a:t>
+            </a:r>
+          </a:p>
+          <a:p>
+            <a:pPr marL="342900" indent="-342900">
+              <a:buAutoNum type="arabicPeriod"/>
+            </a:pPr>
+            <a:r>
+              <a:rPr lang="en-US" dirty="0" smtClean="0"/>
+              <a:t>Create </a:t>
+            </a:r>
+            <a:r>
+              <a:rPr lang="en-US" dirty="0" err="1" smtClean="0"/>
+              <a:t>colour</a:t>
+            </a:r>
+            <a:r>
+              <a:rPr lang="en-US" dirty="0" smtClean="0"/>
+              <a:t> profiles (number pixels per </a:t>
+            </a:r>
+            <a:r>
+              <a:rPr lang="en-US" dirty="0" err="1" smtClean="0"/>
+              <a:t>colour</a:t>
+            </a:r>
+            <a:r>
+              <a:rPr lang="en-US" dirty="0" smtClean="0"/>
+              <a:t>)</a:t>
+            </a:r>
+          </a:p>
+          <a:p>
+            <a:pPr marL="342900" indent="-342900">
+              <a:buAutoNum type="arabicPeriod"/>
+            </a:pPr>
+            <a:r>
+              <a:rPr lang="en-US" dirty="0" smtClean="0"/>
+              <a:t>Correlate (Spearman) each pair of </a:t>
+            </a:r>
+            <a:r>
+              <a:rPr lang="en-US" dirty="0" err="1" smtClean="0"/>
+              <a:t>colour</a:t>
+            </a:r>
+            <a:r>
+              <a:rPr lang="en-US" dirty="0" smtClean="0"/>
+              <a:t> profiles</a:t>
+            </a:r>
+          </a:p>
+          <a:p>
+            <a:r>
+              <a:rPr lang="en-US" i="1" dirty="0" smtClean="0"/>
+              <a:t>Foreground </a:t>
+            </a:r>
+            <a:r>
+              <a:rPr lang="en-US" i="1" dirty="0" err="1" smtClean="0"/>
+              <a:t>vs</a:t>
+            </a:r>
+            <a:r>
+              <a:rPr lang="en-US" i="1" dirty="0" smtClean="0"/>
+              <a:t> all-pixels makes very little difference.</a:t>
+            </a:r>
+            <a:endParaRPr lang="en-US" dirty="0" smtClean="0"/>
+          </a:p>
+        </p:txBody>
+      </p:sp>
+      <p:pic>
+        <p:nvPicPr>
+          <p:cNvPr id="1027" name="Picture 3"/>
+          <p:cNvPicPr>
+            <a:picLocks noChangeAspect="1" noChangeArrowheads="1"/>
+          </p:cNvPicPr>
+          <p:nvPr/>
+        </p:nvPicPr>
+        <p:blipFill>
+          <a:blip r:embed="rId2" cstate="print">
+            <a:extLst>
+              <a:ext uri="{28A0092B-C50C-407E-A947-70E740481C1C}">
+                <a14:useLocalDpi xmlns:a14="http://schemas.microsoft.com/office/drawing/2010/main" val="0"/>
+              </a:ext>
+            </a:extLst>
+          </a:blip>
+          <a:srcRect/>
+          <a:stretch>
+            <a:fillRect/>
+          </a:stretch>
+        </p:blipFill>
+        <p:spPr bwMode="auto">
+          <a:xfrm>
+            <a:off x="863600" y="1490940"/>
+            <a:ext cx="5588000" cy="3463647"/>
+          </a:xfrm>
+          <a:prstGeom prst="rect">
+            <a:avLst/>
+          </a:prstGeom>
+          <a:noFill/>
+          <a:ln>
+            <a:noFill/>
+          </a:ln>
+          <a:effectLst/>
+          <a:extLst>
+            <a:ext uri="{909E8E84-426E-40DD-AFC4-6F175D3DCCD1}">
+              <a14:hiddenFill xmlns:a14="http://schemas.microsoft.com/office/drawing/2010/main">
+                <a:solidFill>
+                  <a:schemeClr val="accent1"/>
+                </a:solidFill>
+              </a14:hiddenFill>
+            </a:ext>
+            <a:ext uri="{91240B29-F687-4F45-9708-019B960494DF}">
+              <a14:hiddenLine xmlns:a14="http://schemas.microsoft.com/office/drawing/2010/main" w="9525">
+                <a:solidFill>
+                  <a:schemeClr val="tx1"/>
+                </a:solidFill>
+                <a:miter lim="800000"/>
+                <a:headEnd/>
+                <a:tailEnd/>
+              </a14:hiddenLine>
+            </a:ext>
+            <a:ext uri="{AF507438-7753-43E0-B8FC-AC1667EBCBE1}">
+              <a14:hiddenEffects xmlns:a14="http://schemas.microsoft.com/office/drawing/2010/main">
+                <a:effectLst>
+                  <a:outerShdw dist="35921" dir="2700000" algn="ctr" rotWithShape="0">
+                    <a:schemeClr val="bg2"/>
+                  </a:outerShdw>
+                </a:effectLst>
+              </a14:hiddenEffects>
+            </a:ext>
+          </a:extLst>
+        </p:spPr>
+      </p:pic>
+      <p:pic>
+        <p:nvPicPr>
+          <p:cNvPr id="1030" name="Picture 6"/>
+          <p:cNvPicPr>
+            <a:picLocks noChangeAspect="1" noChangeArrowheads="1"/>
+          </p:cNvPicPr>
+          <p:nvPr/>
+        </p:nvPicPr>
+        <p:blipFill>
+          <a:blip r:embed="rId3" cstate="print">
+            <a:extLst>
+              <a:ext uri="{28A0092B-C50C-407E-A947-70E740481C1C}">
+                <a14:useLocalDpi xmlns:a14="http://schemas.microsoft.com/office/drawing/2010/main" val="0"/>
+              </a:ext>
+            </a:extLst>
+          </a:blip>
+          <a:srcRect/>
+          <a:stretch>
+            <a:fillRect/>
+          </a:stretch>
+        </p:blipFill>
+        <p:spPr bwMode="auto">
+          <a:xfrm>
+            <a:off x="8726617" y="3810122"/>
+            <a:ext cx="2697606" cy="2579688"/>
+          </a:xfrm>
+          <a:prstGeom prst="rect">
+            <a:avLst/>
+          </a:prstGeom>
+          <a:noFill/>
+          <a:ln>
+            <a:noFill/>
+          </a:ln>
+          <a:effectLst/>
+          <a:extLst>
+            <a:ext uri="{909E8E84-426E-40DD-AFC4-6F175D3DCCD1}">
+              <a14:hiddenFill xmlns:a14="http://schemas.microsoft.com/office/drawing/2010/main">
+                <a:solidFill>
+                  <a:schemeClr val="accent1"/>
+                </a:solidFill>
+              </a14:hiddenFill>
+            </a:ext>
+            <a:ext uri="{91240B29-F687-4F45-9708-019B960494DF}">
+              <a14:hiddenLine xmlns:a14="http://schemas.microsoft.com/office/drawing/2010/main" w="9525">
+                <a:solidFill>
+                  <a:schemeClr val="tx1"/>
+                </a:solidFill>
+                <a:miter lim="800000"/>
+                <a:headEnd/>
+                <a:tailEnd/>
+              </a14:hiddenLine>
+            </a:ext>
+            <a:ext uri="{AF507438-7753-43E0-B8FC-AC1667EBCBE1}">
+              <a14:hiddenEffects xmlns:a14="http://schemas.microsoft.com/office/drawing/2010/main">
+                <a:effectLst>
+                  <a:outerShdw dist="35921" dir="2700000" algn="ctr" rotWithShape="0">
+                    <a:schemeClr val="bg2"/>
+                  </a:outerShdw>
+                </a:effectLst>
+              </a14:hiddenEffects>
+            </a:ext>
+          </a:extLst>
+        </p:spPr>
+      </p:pic>
+      <p:pic>
+        <p:nvPicPr>
+          <p:cNvPr id="1031" name="Picture 7"/>
+          <p:cNvPicPr>
+            <a:picLocks noChangeAspect="1" noChangeArrowheads="1"/>
+          </p:cNvPicPr>
+          <p:nvPr/>
+        </p:nvPicPr>
+        <p:blipFill>
+          <a:blip r:embed="rId4" cstate="print">
+            <a:extLst>
+              <a:ext uri="{28A0092B-C50C-407E-A947-70E740481C1C}">
+                <a14:useLocalDpi xmlns:a14="http://schemas.microsoft.com/office/drawing/2010/main" val="0"/>
+              </a:ext>
+            </a:extLst>
+          </a:blip>
+          <a:srcRect/>
+          <a:stretch>
+            <a:fillRect/>
+          </a:stretch>
+        </p:blipFill>
+        <p:spPr bwMode="auto">
+          <a:xfrm>
+            <a:off x="8754620" y="1354121"/>
+            <a:ext cx="2641600" cy="2456001"/>
+          </a:xfrm>
+          <a:prstGeom prst="rect">
+            <a:avLst/>
+          </a:prstGeom>
+          <a:noFill/>
+          <a:ln>
+            <a:noFill/>
+          </a:ln>
+          <a:effectLst/>
+          <a:extLst>
+            <a:ext uri="{909E8E84-426E-40DD-AFC4-6F175D3DCCD1}">
+              <a14:hiddenFill xmlns:a14="http://schemas.microsoft.com/office/drawing/2010/main">
+                <a:solidFill>
+                  <a:schemeClr val="accent1"/>
+                </a:solidFill>
+              </a14:hiddenFill>
+            </a:ext>
+            <a:ext uri="{91240B29-F687-4F45-9708-019B960494DF}">
+              <a14:hiddenLine xmlns:a14="http://schemas.microsoft.com/office/drawing/2010/main" w="9525">
+                <a:solidFill>
+                  <a:schemeClr val="tx1"/>
+                </a:solidFill>
+                <a:miter lim="800000"/>
+                <a:headEnd/>
+                <a:tailEnd/>
+              </a14:hiddenLine>
+            </a:ext>
+            <a:ext uri="{AF507438-7753-43E0-B8FC-AC1667EBCBE1}">
+              <a14:hiddenEffects xmlns:a14="http://schemas.microsoft.com/office/drawing/2010/main">
+                <a:effectLst>
+                  <a:outerShdw dist="35921" dir="2700000" algn="ctr" rotWithShape="0">
+                    <a:schemeClr val="bg2"/>
+                  </a:outerShdw>
+                </a:effectLst>
+              </a14:hiddenEffects>
+            </a:ext>
+          </a:extLst>
+        </p:spPr>
+      </p:pic>
+    </p:spTree>
+    <p:extLst>
+      <p:ext uri="{BB962C8B-B14F-4D97-AF65-F5344CB8AC3E}">
+        <p14:creationId xmlns:p14="http://schemas.microsoft.com/office/powerpoint/2010/main" val="2330438563"/>
+      </p:ext>
+    </p:extLst>
+  </p:cSld>
+  <p:clrMapOvr>
+    <a:masterClrMapping/>
+  </p:clrMapOvr>
+</p:sld>
+</file>
+
 <file path=ppt/slides/slide2.xml><?xml version="1.0" encoding="utf-8"?>
 <p:sld xmlns:a="http://schemas.openxmlformats.org/drawingml/2006/main" xmlns:r="http://schemas.openxmlformats.org/officeDocument/2006/relationships" xmlns:p="http://schemas.openxmlformats.org/presentationml/2006/main">
   <p:cSld>
@@ -4748,11 +5107,7 @@
             </a:r>
             <a:r>
               <a:rPr lang="en-US" dirty="0" smtClean="0"/>
-              <a:t> </a:t>
-            </a:r>
-            <a:r>
-              <a:rPr lang="en-US" dirty="0" smtClean="0"/>
-              <a:t>Average (All)</a:t>
+              <a:t> Average (All)</a:t>
             </a:r>
             <a:endParaRPr lang="en-US" dirty="0"/>
           </a:p>
@@ -4799,7 +5154,6 @@
               <a:rPr lang="en-US" dirty="0" smtClean="0"/>
               <a:t>Average, but uses all pixels (not just foreground)</a:t>
             </a:r>
-            <a:endParaRPr lang="en-US" dirty="0" smtClean="0"/>
           </a:p>
           <a:p>
             <a:pPr marL="342900" indent="-342900">
@@ -4949,7 +5303,7 @@
     </a:clrScheme>
     <a:fontScheme name="Office">
       <a:majorFont>
-        <a:latin typeface="Calibri Light" panose="020F0302020204030204"/>
+        <a:latin typeface="Calibri Light"/>
         <a:ea typeface=""/>
         <a:cs typeface=""/>
         <a:font script="Jpan" typeface="ＭＳ Ｐゴシック"/>
@@ -4984,7 +5338,7 @@
         <a:font script="Geor" typeface="Sylfaen"/>
       </a:majorFont>
       <a:minorFont>
-        <a:latin typeface="Calibri" panose="020F0502020204030204"/>
+        <a:latin typeface="Calibri"/>
         <a:ea typeface=""/>
         <a:cs typeface=""/>
         <a:font script="Jpan" typeface="ＭＳ Ｐゴシック"/>
@@ -5161,7 +5515,7 @@
   <a:extraClrSchemeLst/>
   <a:extLst>
     <a:ext uri="{05A4C25C-085E-4340-85A3-A5531E510DB2}">
-      <thm15:themeFamily xmlns:thm15="http://schemas.microsoft.com/office/thememl/2012/main" name="Office Theme" id="{62F939B6-93AF-4DB8-9C6B-D6C7DFDC589F}" vid="{4A3C46E8-61CC-4603-A589-7422A47A8E4A}"/>
+      <thm15:themeFamily xmlns:thm15="http://schemas.microsoft.com/office/thememl/2012/main" xmlns="" name="Office Theme" id="{62F939B6-93AF-4DB8-9C6B-D6C7DFDC589F}" vid="{4A3C46E8-61CC-4603-A589-7422A47A8E4A}"/>
     </a:ext>
   </a:extLst>
 </a:theme>

</xml_diff>